<commit_message>
Update Kap. 7.4 Bilder med JavaScript.pptx
</commit_message>
<xml_diff>
--- a/it2/Kap-7.4-Bilder med JavaScript/Kap. 7.4 Bilder med JavaScript.pptx
+++ b/it2/Kap-7.4-Bilder med JavaScript/Kap. 7.4 Bilder med JavaScript.pptx
@@ -12,10 +12,10 @@
     <p:sldId id="257" r:id="rId3"/>
     <p:sldId id="258" r:id="rId4"/>
     <p:sldId id="259" r:id="rId5"/>
-    <p:sldId id="260" r:id="rId6"/>
-    <p:sldId id="262" r:id="rId7"/>
-    <p:sldId id="263" r:id="rId8"/>
-    <p:sldId id="261" r:id="rId9"/>
+    <p:sldId id="261" r:id="rId6"/>
+    <p:sldId id="260" r:id="rId7"/>
+    <p:sldId id="262" r:id="rId8"/>
+    <p:sldId id="263" r:id="rId9"/>
     <p:sldId id="264" r:id="rId10"/>
     <p:sldId id="265" r:id="rId11"/>
     <p:sldId id="266" r:id="rId12"/>
@@ -124,6 +124,11 @@
       </a:defRPr>
     </a:lvl9pPr>
   </p:defaultTextStyle>
+  <p:extLst>
+    <p:ext uri="{EFAFB233-063F-42B5-8137-9DF3F51BA10A}">
+      <p15:sldGuideLst xmlns:p15="http://schemas.microsoft.com/office/powerpoint/2012/main"/>
+    </p:ext>
+  </p:extLst>
 </p:presentation>
 </file>
 
@@ -209,7 +214,7 @@
           <a:p>
             <a:fld id="{9706A10B-E8CC-47DD-8F95-C517D0D2891C}" type="datetimeFigureOut">
               <a:rPr lang="nb-NO" smtClean="0"/>
-              <a:t>17.11.2019</a:t>
+              <a:t>18.11.2019</a:t>
             </a:fld>
             <a:endParaRPr lang="nb-NO"/>
           </a:p>
@@ -715,6 +720,16 @@
           <a:bodyPr/>
           <a:lstStyle/>
           <a:p>
+            <a:r>
+              <a:rPr lang="nb-NO" dirty="0" smtClean="0"/>
+              <a:t>W3school: </a:t>
+            </a:r>
+            <a:r>
+              <a:rPr lang="nb-NO" dirty="0" smtClean="0">
+                <a:hlinkClick r:id="rId3"/>
+              </a:rPr>
+              <a:t>https://www.w3schools.com/cssref/pr_class_position.asp</a:t>
+            </a:r>
             <a:endParaRPr lang="nb-NO" dirty="0"/>
           </a:p>
         </p:txBody>
@@ -736,7 +751,7 @@
           <a:p>
             <a:fld id="{2B23BF84-D2EE-4BC8-ACA5-15E11A6FA754}" type="slidenum">
               <a:rPr lang="nb-NO" smtClean="0"/>
-              <a:t>6</a:t>
+              <a:t>5</a:t>
             </a:fld>
             <a:endParaRPr lang="nb-NO"/>
           </a:p>
@@ -745,7 +760,7 @@
     </p:spTree>
     <p:extLst>
       <p:ext uri="{BB962C8B-B14F-4D97-AF65-F5344CB8AC3E}">
-        <p14:creationId xmlns:p14="http://schemas.microsoft.com/office/powerpoint/2010/main" val="731891237"/>
+        <p14:creationId xmlns:p14="http://schemas.microsoft.com/office/powerpoint/2010/main" val="1677354821"/>
       </p:ext>
     </p:extLst>
   </p:cSld>
@@ -799,20 +814,6 @@
           <a:bodyPr/>
           <a:lstStyle/>
           <a:p>
-            <a:r>
-              <a:rPr lang="nb-NO" dirty="0" smtClean="0"/>
-              <a:t>Hele</a:t>
-            </a:r>
-            <a:r>
-              <a:rPr lang="nb-NO" baseline="0" dirty="0" smtClean="0"/>
-              <a:t> koden finner dere her:</a:t>
-            </a:r>
-          </a:p>
-          <a:p>
-            <a:r>
-              <a:rPr lang="nb-NO" dirty="0" smtClean="0"/>
-              <a:t>https://gist.github.com/overas/6d93ea24e5c21da7e3d018989537ab77</a:t>
-            </a:r>
             <a:endParaRPr lang="nb-NO" dirty="0"/>
           </a:p>
         </p:txBody>
@@ -843,7 +844,7 @@
     </p:spTree>
     <p:extLst>
       <p:ext uri="{BB962C8B-B14F-4D97-AF65-F5344CB8AC3E}">
-        <p14:creationId xmlns:p14="http://schemas.microsoft.com/office/powerpoint/2010/main" val="4187446445"/>
+        <p14:creationId xmlns:p14="http://schemas.microsoft.com/office/powerpoint/2010/main" val="731891237"/>
       </p:ext>
     </p:extLst>
   </p:cSld>
@@ -899,13 +900,17 @@
           <a:p>
             <a:r>
               <a:rPr lang="nb-NO" dirty="0" smtClean="0"/>
-              <a:t>W3school: </a:t>
-            </a:r>
-            <a:r>
-              <a:rPr lang="nb-NO" dirty="0" smtClean="0">
-                <a:hlinkClick r:id="rId3"/>
-              </a:rPr>
-              <a:t>https://www.w3schools.com/cssref/pr_class_position.asp</a:t>
+              <a:t>Hele</a:t>
+            </a:r>
+            <a:r>
+              <a:rPr lang="nb-NO" baseline="0" dirty="0" smtClean="0"/>
+              <a:t> koden finner dere her:</a:t>
+            </a:r>
+          </a:p>
+          <a:p>
+            <a:r>
+              <a:rPr lang="nb-NO" dirty="0" smtClean="0"/>
+              <a:t>https://gist.github.com/overas/6d93ea24e5c21da7e3d018989537ab77</a:t>
             </a:r>
             <a:endParaRPr lang="nb-NO" dirty="0"/>
           </a:p>
@@ -937,7 +942,7 @@
     </p:spTree>
     <p:extLst>
       <p:ext uri="{BB962C8B-B14F-4D97-AF65-F5344CB8AC3E}">
-        <p14:creationId xmlns:p14="http://schemas.microsoft.com/office/powerpoint/2010/main" val="1677354821"/>
+        <p14:creationId xmlns:p14="http://schemas.microsoft.com/office/powerpoint/2010/main" val="4187446445"/>
       </p:ext>
     </p:extLst>
   </p:cSld>
@@ -1542,7 +1547,7 @@
           <a:p>
             <a:fld id="{23F597DD-7D55-4450-ABA7-DEBDBEED6392}" type="datetimeFigureOut">
               <a:rPr lang="nb-NO" smtClean="0"/>
-              <a:t>17.11.2019</a:t>
+              <a:t>18.11.2019</a:t>
             </a:fld>
             <a:endParaRPr lang="nb-NO"/>
           </a:p>
@@ -1712,7 +1717,7 @@
           <a:p>
             <a:fld id="{23F597DD-7D55-4450-ABA7-DEBDBEED6392}" type="datetimeFigureOut">
               <a:rPr lang="nb-NO" smtClean="0"/>
-              <a:t>17.11.2019</a:t>
+              <a:t>18.11.2019</a:t>
             </a:fld>
             <a:endParaRPr lang="nb-NO"/>
           </a:p>
@@ -1892,7 +1897,7 @@
           <a:p>
             <a:fld id="{23F597DD-7D55-4450-ABA7-DEBDBEED6392}" type="datetimeFigureOut">
               <a:rPr lang="nb-NO" smtClean="0"/>
-              <a:t>17.11.2019</a:t>
+              <a:t>18.11.2019</a:t>
             </a:fld>
             <a:endParaRPr lang="nb-NO"/>
           </a:p>
@@ -2062,7 +2067,7 @@
           <a:p>
             <a:fld id="{23F597DD-7D55-4450-ABA7-DEBDBEED6392}" type="datetimeFigureOut">
               <a:rPr lang="nb-NO" smtClean="0"/>
-              <a:t>17.11.2019</a:t>
+              <a:t>18.11.2019</a:t>
             </a:fld>
             <a:endParaRPr lang="nb-NO"/>
           </a:p>
@@ -2308,7 +2313,7 @@
           <a:p>
             <a:fld id="{23F597DD-7D55-4450-ABA7-DEBDBEED6392}" type="datetimeFigureOut">
               <a:rPr lang="nb-NO" smtClean="0"/>
-              <a:t>17.11.2019</a:t>
+              <a:t>18.11.2019</a:t>
             </a:fld>
             <a:endParaRPr lang="nb-NO"/>
           </a:p>
@@ -2540,7 +2545,7 @@
           <a:p>
             <a:fld id="{23F597DD-7D55-4450-ABA7-DEBDBEED6392}" type="datetimeFigureOut">
               <a:rPr lang="nb-NO" smtClean="0"/>
-              <a:t>17.11.2019</a:t>
+              <a:t>18.11.2019</a:t>
             </a:fld>
             <a:endParaRPr lang="nb-NO"/>
           </a:p>
@@ -2907,7 +2912,7 @@
           <a:p>
             <a:fld id="{23F597DD-7D55-4450-ABA7-DEBDBEED6392}" type="datetimeFigureOut">
               <a:rPr lang="nb-NO" smtClean="0"/>
-              <a:t>17.11.2019</a:t>
+              <a:t>18.11.2019</a:t>
             </a:fld>
             <a:endParaRPr lang="nb-NO"/>
           </a:p>
@@ -3025,7 +3030,7 @@
           <a:p>
             <a:fld id="{23F597DD-7D55-4450-ABA7-DEBDBEED6392}" type="datetimeFigureOut">
               <a:rPr lang="nb-NO" smtClean="0"/>
-              <a:t>17.11.2019</a:t>
+              <a:t>18.11.2019</a:t>
             </a:fld>
             <a:endParaRPr lang="nb-NO"/>
           </a:p>
@@ -3120,7 +3125,7 @@
           <a:p>
             <a:fld id="{23F597DD-7D55-4450-ABA7-DEBDBEED6392}" type="datetimeFigureOut">
               <a:rPr lang="nb-NO" smtClean="0"/>
-              <a:t>17.11.2019</a:t>
+              <a:t>18.11.2019</a:t>
             </a:fld>
             <a:endParaRPr lang="nb-NO"/>
           </a:p>
@@ -3397,7 +3402,7 @@
           <a:p>
             <a:fld id="{23F597DD-7D55-4450-ABA7-DEBDBEED6392}" type="datetimeFigureOut">
               <a:rPr lang="nb-NO" smtClean="0"/>
-              <a:t>17.11.2019</a:t>
+              <a:t>18.11.2019</a:t>
             </a:fld>
             <a:endParaRPr lang="nb-NO"/>
           </a:p>
@@ -3650,7 +3655,7 @@
           <a:p>
             <a:fld id="{23F597DD-7D55-4450-ABA7-DEBDBEED6392}" type="datetimeFigureOut">
               <a:rPr lang="nb-NO" smtClean="0"/>
-              <a:t>17.11.2019</a:t>
+              <a:t>18.11.2019</a:t>
             </a:fld>
             <a:endParaRPr lang="nb-NO"/>
           </a:p>
@@ -3863,7 +3868,7 @@
           <a:p>
             <a:fld id="{23F597DD-7D55-4450-ABA7-DEBDBEED6392}" type="datetimeFigureOut">
               <a:rPr lang="nb-NO" smtClean="0"/>
-              <a:t>17.11.2019</a:t>
+              <a:t>18.11.2019</a:t>
             </a:fld>
             <a:endParaRPr lang="nb-NO"/>
           </a:p>
@@ -4587,15 +4592,15 @@
         </p:spPr>
         <p:txBody>
           <a:bodyPr>
-            <a:normAutofit/>
+            <a:noAutofit/>
           </a:bodyPr>
           <a:lstStyle/>
           <a:p>
             <a:r>
-              <a:rPr lang="nb-NO" sz="2000" dirty="0" smtClean="0"/>
+              <a:rPr lang="nb-NO" sz="2200" dirty="0" smtClean="0"/>
               <a:t>Bilde på nettsiden er 1900 piksler bredt. Ved hjelp av CSS setter vi bredden til 475 piksler.</a:t>
             </a:r>
-            <a:endParaRPr lang="nb-NO" sz="2000" dirty="0"/>
+            <a:endParaRPr lang="nb-NO" sz="2200" dirty="0"/>
           </a:p>
         </p:txBody>
       </p:sp>
@@ -4696,12 +4701,12 @@
         <p:spPr>
           <a:xfrm>
             <a:off x="839788" y="1270861"/>
-            <a:ext cx="10411981" cy="759417"/>
+            <a:ext cx="10411981" cy="945397"/>
           </a:xfrm>
         </p:spPr>
         <p:txBody>
           <a:bodyPr>
-            <a:normAutofit fontScale="92500"/>
+            <a:normAutofit/>
           </a:bodyPr>
           <a:lstStyle/>
           <a:p>
@@ -5267,25 +5272,27 @@
           <a:lstStyle/>
           <a:p>
             <a:r>
-              <a:rPr lang="nb-NO" dirty="0" smtClean="0"/>
-              <a:t>Vi kan bruke en gjennomsiktig bildefil med fire ikoner som er lenker til fagene matte, kjemi, kunst og håndverk.</a:t>
-            </a:r>
-          </a:p>
-          <a:p>
-            <a:r>
-              <a:rPr lang="nb-NO" dirty="0" smtClean="0"/>
-              <a:t>Med CSS angir vi posisjonen til et bakgrunnsbilde slik: </a:t>
-            </a:r>
-            <a:r>
-              <a:rPr lang="nb-NO" i="1" dirty="0" err="1" smtClean="0"/>
+              <a:rPr lang="nb-NO" sz="2000" dirty="0" smtClean="0"/>
+              <a:t>Vi kan bruke en gjennomsiktig bildefil med fire ikoner som er lenker til fagene matte, kjemi, kunst og </a:t>
+            </a:r>
+            <a:r>
+              <a:rPr lang="nb-NO" sz="2000" dirty="0" smtClean="0"/>
+              <a:t>håndverk. Med </a:t>
+            </a:r>
+            <a:r>
+              <a:rPr lang="nb-NO" sz="2000" dirty="0" smtClean="0"/>
+              <a:t>CSS angir vi posisjonen til et bakgrunnsbilde slik: </a:t>
+            </a:r>
+            <a:r>
+              <a:rPr lang="nb-NO" sz="2000" i="1" dirty="0" err="1" smtClean="0"/>
               <a:t>background-position</a:t>
             </a:r>
             <a:r>
-              <a:rPr lang="nb-NO" i="1" dirty="0" smtClean="0"/>
+              <a:rPr lang="nb-NO" sz="2000" i="1" dirty="0" smtClean="0"/>
               <a:t>: x y; </a:t>
             </a:r>
             <a:r>
-              <a:rPr lang="nb-NO" dirty="0" smtClean="0"/>
+              <a:rPr lang="nb-NO" sz="2000" dirty="0" smtClean="0"/>
               <a:t>. Her er x avstanden fra venstre kant, og y er avstanden fra toppen.</a:t>
             </a:r>
           </a:p>
@@ -5781,6 +5788,30 @@
           </a:p>
         </p:txBody>
       </p:sp>
+      <p:pic>
+        <p:nvPicPr>
+          <p:cNvPr id="4" name="Bilde 3"/>
+          <p:cNvPicPr>
+            <a:picLocks noChangeAspect="1"/>
+          </p:cNvPicPr>
+          <p:nvPr/>
+        </p:nvPicPr>
+        <p:blipFill>
+          <a:blip r:embed="rId2"/>
+          <a:stretch>
+            <a:fillRect/>
+          </a:stretch>
+        </p:blipFill>
+        <p:spPr>
+          <a:xfrm>
+            <a:off x="8075020" y="4708659"/>
+            <a:ext cx="2957669" cy="1118704"/>
+          </a:xfrm>
+          <a:prstGeom prst="rect">
+            <a:avLst/>
+          </a:prstGeom>
+        </p:spPr>
+      </p:pic>
     </p:spTree>
     <p:extLst>
       <p:ext uri="{BB962C8B-B14F-4D97-AF65-F5344CB8AC3E}">
@@ -6046,6 +6077,152 @@
           </a:p>
         </p:txBody>
       </p:sp>
+      <p:sp>
+        <p:nvSpPr>
+          <p:cNvPr id="3" name="Plassholder for innhold 2"/>
+          <p:cNvSpPr>
+            <a:spLocks noGrp="1"/>
+          </p:cNvSpPr>
+          <p:nvPr>
+            <p:ph idx="1"/>
+          </p:nvPr>
+        </p:nvSpPr>
+        <p:spPr/>
+        <p:txBody>
+          <a:bodyPr/>
+          <a:lstStyle/>
+          <a:p>
+            <a:r>
+              <a:rPr lang="nb-NO" dirty="0" smtClean="0"/>
+              <a:t>Hvis vi legger HTML-elementer med absolutt posisjonering inni et HTML-element som har </a:t>
+            </a:r>
+            <a:r>
+              <a:rPr lang="nb-NO" i="1" dirty="0" err="1" smtClean="0"/>
+              <a:t>position</a:t>
+            </a:r>
+            <a:r>
+              <a:rPr lang="nb-NO" i="1" dirty="0" smtClean="0"/>
+              <a:t>: relative</a:t>
+            </a:r>
+            <a:r>
+              <a:rPr lang="nb-NO" dirty="0" smtClean="0"/>
+              <a:t>, vil avstandene settes i forhold til elementet med </a:t>
+            </a:r>
+            <a:r>
+              <a:rPr lang="nb-NO" i="1" dirty="0" err="1" smtClean="0"/>
+              <a:t>position</a:t>
+            </a:r>
+            <a:r>
+              <a:rPr lang="nb-NO" i="1" dirty="0" smtClean="0"/>
+              <a:t>: relative</a:t>
+            </a:r>
+            <a:r>
+              <a:rPr lang="nb-NO" dirty="0" smtClean="0"/>
+              <a:t>.</a:t>
+            </a:r>
+          </a:p>
+          <a:p>
+            <a:endParaRPr lang="nb-NO" dirty="0" smtClean="0"/>
+          </a:p>
+          <a:p>
+            <a:r>
+              <a:rPr lang="nb-NO" dirty="0" smtClean="0"/>
+              <a:t>Det HTML-elementet som legges inn lengst ned i HTML-koden legger seg over elementer som legges inn høyere opp.</a:t>
+            </a:r>
+          </a:p>
+          <a:p>
+            <a:endParaRPr lang="nb-NO" dirty="0"/>
+          </a:p>
+          <a:p>
+            <a:r>
+              <a:rPr lang="nb-NO" dirty="0" smtClean="0"/>
+              <a:t>Dette kan overstyres ved å sette CSS-stilen </a:t>
+            </a:r>
+            <a:r>
+              <a:rPr lang="nb-NO" i="1" dirty="0" smtClean="0"/>
+              <a:t>z-</a:t>
+            </a:r>
+            <a:r>
+              <a:rPr lang="nb-NO" i="1" dirty="0" err="1" smtClean="0"/>
+              <a:t>index</a:t>
+            </a:r>
+            <a:r>
+              <a:rPr lang="nb-NO" i="1" dirty="0" smtClean="0"/>
+              <a:t>: verdi;</a:t>
+            </a:r>
+            <a:r>
+              <a:rPr lang="nb-NO" dirty="0" smtClean="0"/>
+              <a:t> Jo høyere </a:t>
+            </a:r>
+            <a:r>
+              <a:rPr lang="nb-NO" i="1" dirty="0" smtClean="0"/>
+              <a:t>z-</a:t>
+            </a:r>
+            <a:r>
+              <a:rPr lang="nb-NO" i="1" dirty="0" err="1" smtClean="0"/>
+              <a:t>index</a:t>
+            </a:r>
+            <a:r>
+              <a:rPr lang="nb-NO" dirty="0" smtClean="0"/>
+              <a:t>, jo nærmere øyet legger HTML-elementet seg.</a:t>
+            </a:r>
+            <a:endParaRPr lang="nb-NO" i="1" dirty="0"/>
+          </a:p>
+        </p:txBody>
+      </p:sp>
+    </p:spTree>
+    <p:extLst>
+      <p:ext uri="{BB962C8B-B14F-4D97-AF65-F5344CB8AC3E}">
+        <p14:creationId xmlns:p14="http://schemas.microsoft.com/office/powerpoint/2010/main" val="2792464965"/>
+      </p:ext>
+    </p:extLst>
+  </p:cSld>
+  <p:clrMapOvr>
+    <a:masterClrMapping/>
+  </p:clrMapOvr>
+</p:sld>
+</file>
+
+<file path=ppt/slides/slide6.xml><?xml version="1.0" encoding="utf-8"?>
+<p:sld xmlns:a="http://schemas.openxmlformats.org/drawingml/2006/main" xmlns:r="http://schemas.openxmlformats.org/officeDocument/2006/relationships" xmlns:p="http://schemas.openxmlformats.org/presentationml/2006/main">
+  <p:cSld>
+    <p:spTree>
+      <p:nvGrpSpPr>
+        <p:cNvPr id="1" name=""/>
+        <p:cNvGrpSpPr/>
+        <p:nvPr/>
+      </p:nvGrpSpPr>
+      <p:grpSpPr>
+        <a:xfrm>
+          <a:off x="0" y="0"/>
+          <a:ext cx="0" cy="0"/>
+          <a:chOff x="0" y="0"/>
+          <a:chExt cx="0" cy="0"/>
+        </a:xfrm>
+      </p:grpSpPr>
+      <p:sp>
+        <p:nvSpPr>
+          <p:cNvPr id="2" name="Tittel 1"/>
+          <p:cNvSpPr>
+            <a:spLocks noGrp="1"/>
+          </p:cNvSpPr>
+          <p:nvPr>
+            <p:ph type="title"/>
+          </p:nvPr>
+        </p:nvSpPr>
+        <p:spPr/>
+        <p:txBody>
+          <a:bodyPr/>
+          <a:lstStyle/>
+          <a:p>
+            <a:r>
+              <a:rPr lang="nb-NO" dirty="0" smtClean="0"/>
+              <a:t>Bilde med tekst som ligger over et bilde</a:t>
+            </a:r>
+            <a:endParaRPr lang="nb-NO" dirty="0"/>
+          </a:p>
+        </p:txBody>
+      </p:sp>
       <p:graphicFrame>
         <p:nvGraphicFramePr>
           <p:cNvPr id="4" name="Plassholder for innhold 3"/>
@@ -6056,7 +6233,7 @@
             <p:ph idx="1"/>
             <p:extLst>
               <p:ext uri="{D42A27DB-BD31-4B8C-83A1-F6EECF244321}">
-                <p14:modId xmlns:p14="http://schemas.microsoft.com/office/powerpoint/2010/main" val="2204809435"/>
+                <p14:modId xmlns:p14="http://schemas.microsoft.com/office/powerpoint/2010/main" val="3032019710"/>
               </p:ext>
             </p:extLst>
           </p:nvPr>
@@ -6094,10 +6271,10 @@
                     <a:lstStyle/>
                     <a:p>
                       <a:r>
-                        <a:rPr lang="nb-NO" dirty="0" smtClean="0"/>
+                        <a:rPr lang="nb-NO" sz="2200" dirty="0" smtClean="0"/>
                         <a:t>CSS-stiler</a:t>
                       </a:r>
-                      <a:endParaRPr lang="nb-NO" dirty="0"/>
+                      <a:endParaRPr lang="nb-NO" sz="2200" dirty="0"/>
                     </a:p>
                   </a:txBody>
                   <a:tcPr/>
@@ -6108,10 +6285,10 @@
                     <a:lstStyle/>
                     <a:p>
                       <a:r>
-                        <a:rPr lang="nb-NO" dirty="0" smtClean="0"/>
+                        <a:rPr lang="nb-NO" sz="2200" dirty="0" smtClean="0"/>
                         <a:t>Forklaring</a:t>
                       </a:r>
-                      <a:endParaRPr lang="nb-NO" dirty="0"/>
+                      <a:endParaRPr lang="nb-NO" sz="2200" dirty="0"/>
                     </a:p>
                   </a:txBody>
                   <a:tcPr/>
@@ -6129,14 +6306,14 @@
                     <a:lstStyle/>
                     <a:p>
                       <a:r>
-                        <a:rPr lang="nb-NO" dirty="0" err="1" smtClean="0"/>
+                        <a:rPr lang="nb-NO" sz="2200" dirty="0" err="1" smtClean="0"/>
                         <a:t>left</a:t>
                       </a:r>
                       <a:r>
-                        <a:rPr lang="nb-NO" dirty="0" smtClean="0"/>
+                        <a:rPr lang="nb-NO" sz="2200" dirty="0" smtClean="0"/>
                         <a:t>: avstand;</a:t>
                       </a:r>
-                      <a:endParaRPr lang="nb-NO" dirty="0"/>
+                      <a:endParaRPr lang="nb-NO" sz="2200" dirty="0"/>
                     </a:p>
                   </a:txBody>
                   <a:tcPr/>
@@ -6147,22 +6324,22 @@
                     <a:lstStyle/>
                     <a:p>
                       <a:r>
-                        <a:rPr lang="nb-NO" dirty="0" smtClean="0"/>
+                        <a:rPr lang="nb-NO" sz="2200" dirty="0" smtClean="0"/>
                         <a:t>Bestemmer</a:t>
                       </a:r>
                       <a:r>
-                        <a:rPr lang="nb-NO" baseline="0" dirty="0" smtClean="0"/>
+                        <a:rPr lang="nb-NO" sz="2200" baseline="0" dirty="0" smtClean="0"/>
                         <a:t> hvor langt fra </a:t>
                       </a:r>
                       <a:r>
-                        <a:rPr lang="nb-NO" i="1" baseline="0" dirty="0" smtClean="0"/>
+                        <a:rPr lang="nb-NO" sz="2200" i="1" baseline="0" dirty="0" smtClean="0"/>
                         <a:t>venstre</a:t>
                       </a:r>
                       <a:r>
-                        <a:rPr lang="nb-NO" baseline="0" dirty="0" smtClean="0"/>
+                        <a:rPr lang="nb-NO" sz="2200" baseline="0" dirty="0" smtClean="0"/>
                         <a:t> kant HTML-elementet skal ligge</a:t>
                       </a:r>
-                      <a:endParaRPr lang="nb-NO" dirty="0"/>
+                      <a:endParaRPr lang="nb-NO" sz="2200" dirty="0"/>
                     </a:p>
                   </a:txBody>
                   <a:tcPr/>
@@ -6180,10 +6357,10 @@
                     <a:lstStyle/>
                     <a:p>
                       <a:r>
-                        <a:rPr lang="nb-NO" dirty="0" smtClean="0"/>
+                        <a:rPr lang="nb-NO" sz="2200" dirty="0" smtClean="0"/>
                         <a:t>right: avstand;</a:t>
                       </a:r>
-                      <a:endParaRPr lang="nb-NO" dirty="0"/>
+                      <a:endParaRPr lang="nb-NO" sz="2200" dirty="0"/>
                     </a:p>
                   </a:txBody>
                   <a:tcPr/>
@@ -6211,22 +6388,22 @@
                         <a:defRPr/>
                       </a:pPr>
                       <a:r>
-                        <a:rPr lang="nb-NO" dirty="0" smtClean="0"/>
+                        <a:rPr lang="nb-NO" sz="2200" dirty="0" smtClean="0"/>
                         <a:t>Bestemmer</a:t>
                       </a:r>
                       <a:r>
-                        <a:rPr lang="nb-NO" baseline="0" dirty="0" smtClean="0"/>
+                        <a:rPr lang="nb-NO" sz="2200" baseline="0" dirty="0" smtClean="0"/>
                         <a:t> hvor langt fra </a:t>
                       </a:r>
                       <a:r>
-                        <a:rPr lang="nb-NO" i="1" baseline="0" dirty="0" smtClean="0"/>
+                        <a:rPr lang="nb-NO" sz="2200" i="1" baseline="0" dirty="0" smtClean="0"/>
                         <a:t>høyre</a:t>
                       </a:r>
                       <a:r>
-                        <a:rPr lang="nb-NO" baseline="0" dirty="0" smtClean="0"/>
+                        <a:rPr lang="nb-NO" sz="2200" baseline="0" dirty="0" smtClean="0"/>
                         <a:t> kant HTML-elementet skal ligge</a:t>
                       </a:r>
-                      <a:endParaRPr lang="nb-NO" dirty="0" smtClean="0"/>
+                      <a:endParaRPr lang="nb-NO" sz="2200" dirty="0" smtClean="0"/>
                     </a:p>
                   </a:txBody>
                   <a:tcPr/>
@@ -6244,14 +6421,14 @@
                     <a:lstStyle/>
                     <a:p>
                       <a:r>
-                        <a:rPr lang="nb-NO" dirty="0" err="1" smtClean="0"/>
+                        <a:rPr lang="nb-NO" sz="2200" dirty="0" err="1" smtClean="0"/>
                         <a:t>top</a:t>
                       </a:r>
                       <a:r>
-                        <a:rPr lang="nb-NO" dirty="0" smtClean="0"/>
+                        <a:rPr lang="nb-NO" sz="2200" dirty="0" smtClean="0"/>
                         <a:t>: avstand;</a:t>
                       </a:r>
-                      <a:endParaRPr lang="nb-NO" dirty="0"/>
+                      <a:endParaRPr lang="nb-NO" sz="2200" dirty="0"/>
                     </a:p>
                   </a:txBody>
                   <a:tcPr/>
@@ -6279,22 +6456,22 @@
                         <a:defRPr/>
                       </a:pPr>
                       <a:r>
-                        <a:rPr lang="nb-NO" dirty="0" smtClean="0"/>
+                        <a:rPr lang="nb-NO" sz="2200" dirty="0" smtClean="0"/>
                         <a:t>Bestemmer</a:t>
                       </a:r>
                       <a:r>
-                        <a:rPr lang="nb-NO" baseline="0" dirty="0" smtClean="0"/>
+                        <a:rPr lang="nb-NO" sz="2200" baseline="0" dirty="0" smtClean="0"/>
                         <a:t> hvor langt fra </a:t>
                       </a:r>
                       <a:r>
-                        <a:rPr lang="nb-NO" i="1" baseline="0" dirty="0" smtClean="0"/>
+                        <a:rPr lang="nb-NO" sz="2200" i="1" baseline="0" dirty="0" smtClean="0"/>
                         <a:t>øvre</a:t>
                       </a:r>
                       <a:r>
-                        <a:rPr lang="nb-NO" baseline="0" dirty="0" smtClean="0"/>
+                        <a:rPr lang="nb-NO" sz="2200" baseline="0" dirty="0" smtClean="0"/>
                         <a:t> kant HTML-elementet skal ligge</a:t>
                       </a:r>
-                      <a:endParaRPr lang="nb-NO" dirty="0" smtClean="0"/>
+                      <a:endParaRPr lang="nb-NO" sz="2200" dirty="0" smtClean="0"/>
                     </a:p>
                   </a:txBody>
                   <a:tcPr/>
@@ -6312,14 +6489,14 @@
                     <a:lstStyle/>
                     <a:p>
                       <a:r>
-                        <a:rPr lang="nb-NO" dirty="0" err="1" smtClean="0"/>
+                        <a:rPr lang="nb-NO" sz="2200" dirty="0" err="1" smtClean="0"/>
                         <a:t>bottom</a:t>
                       </a:r>
                       <a:r>
-                        <a:rPr lang="nb-NO" dirty="0" smtClean="0"/>
+                        <a:rPr lang="nb-NO" sz="2200" dirty="0" smtClean="0"/>
                         <a:t>: avstand;</a:t>
                       </a:r>
-                      <a:endParaRPr lang="nb-NO" dirty="0"/>
+                      <a:endParaRPr lang="nb-NO" sz="2200" dirty="0"/>
                     </a:p>
                   </a:txBody>
                   <a:tcPr/>
@@ -6347,22 +6524,22 @@
                         <a:defRPr/>
                       </a:pPr>
                       <a:r>
-                        <a:rPr lang="nb-NO" dirty="0" smtClean="0"/>
+                        <a:rPr lang="nb-NO" sz="2200" dirty="0" smtClean="0"/>
                         <a:t>Bestemmer</a:t>
                       </a:r>
                       <a:r>
-                        <a:rPr lang="nb-NO" baseline="0" dirty="0" smtClean="0"/>
+                        <a:rPr lang="nb-NO" sz="2200" baseline="0" dirty="0" smtClean="0"/>
                         <a:t> hvor langt fra </a:t>
                       </a:r>
                       <a:r>
-                        <a:rPr lang="nb-NO" i="1" baseline="0" dirty="0" smtClean="0"/>
+                        <a:rPr lang="nb-NO" sz="2200" i="1" baseline="0" dirty="0" smtClean="0"/>
                         <a:t>nedre </a:t>
                       </a:r>
                       <a:r>
-                        <a:rPr lang="nb-NO" baseline="0" dirty="0" smtClean="0"/>
+                        <a:rPr lang="nb-NO" sz="2200" baseline="0" dirty="0" smtClean="0"/>
                         <a:t>kant HTML-elementet skal ligge</a:t>
                       </a:r>
-                      <a:endParaRPr lang="nb-NO" dirty="0" smtClean="0"/>
+                      <a:endParaRPr lang="nb-NO" sz="2200" dirty="0" smtClean="0"/>
                     </a:p>
                   </a:txBody>
                   <a:tcPr/>
@@ -6469,11 +6646,7 @@
             </a:r>
             <a:r>
               <a:rPr lang="nb-NO" dirty="0" smtClean="0"/>
-              <a:t>/*</a:t>
-            </a:r>
-            <a:r>
-              <a:rPr lang="nb-NO" dirty="0" smtClean="0"/>
-              <a:t>Gir</a:t>
+              <a:t>/*Gir</a:t>
             </a:r>
             <a:r>
               <a:rPr lang="nb-NO" baseline="0" dirty="0" smtClean="0"/>
@@ -6500,7 +6673,7 @@
 </p:sld>
 </file>
 
-<file path=ppt/slides/slide6.xml><?xml version="1.0" encoding="utf-8"?>
+<file path=ppt/slides/slide7.xml><?xml version="1.0" encoding="utf-8"?>
 <p:sld xmlns:a="http://schemas.openxmlformats.org/drawingml/2006/main" xmlns:r="http://schemas.openxmlformats.org/officeDocument/2006/relationships" xmlns:p="http://schemas.openxmlformats.org/presentationml/2006/main">
   <p:cSld>
     <p:spTree>
@@ -6593,8 +6766,8 @@
         </p:nvSpPr>
         <p:spPr>
           <a:xfrm>
-            <a:off x="839788" y="1628196"/>
-            <a:ext cx="4832592" cy="4240792"/>
+            <a:off x="839788" y="1472339"/>
+            <a:ext cx="5856906" cy="4726983"/>
           </a:xfrm>
         </p:spPr>
         <p:txBody>
@@ -6602,7 +6775,7 @@
           <a:lstStyle/>
           <a:p>
             <a:r>
-              <a:rPr lang="nb-NO" dirty="0" smtClean="0"/>
+              <a:rPr lang="nb-NO" sz="2000" dirty="0" smtClean="0"/>
               <a:t>Uten CSS som setter absolutt posisjonering på HTML-elementene vil elementene skyve hverandre vekk.</a:t>
             </a:r>
           </a:p>
@@ -6672,7 +6845,7 @@
 </p:sld>
 </file>
 
-<file path=ppt/slides/slide7.xml><?xml version="1.0" encoding="utf-8"?>
+<file path=ppt/slides/slide8.xml><?xml version="1.0" encoding="utf-8"?>
 <p:sld xmlns:a="http://schemas.openxmlformats.org/drawingml/2006/main" xmlns:r="http://schemas.openxmlformats.org/officeDocument/2006/relationships" xmlns:p="http://schemas.openxmlformats.org/presentationml/2006/main">
   <p:cSld>
     <p:spTree>
@@ -6739,8 +6912,8 @@
         </p:nvSpPr>
         <p:spPr>
           <a:xfrm>
-            <a:off x="839788" y="1270861"/>
-            <a:ext cx="4119670" cy="4598127"/>
+            <a:off x="839788" y="1208869"/>
+            <a:ext cx="4119670" cy="4660120"/>
           </a:xfrm>
         </p:spPr>
         <p:txBody>
@@ -6748,7 +6921,7 @@
           <a:lstStyle/>
           <a:p>
             <a:r>
-              <a:rPr lang="nb-NO" dirty="0" smtClean="0"/>
+              <a:rPr lang="nb-NO" sz="1800" dirty="0" smtClean="0"/>
               <a:t>Med CSS setter vi inn absolutt posisjonering på HTML-elementene. De forskjellige elementene legger seg oppå hverandre.</a:t>
             </a:r>
           </a:p>
@@ -6799,8 +6972,8 @@
         </p:blipFill>
         <p:spPr>
           <a:xfrm>
-            <a:off x="956922" y="2213940"/>
-            <a:ext cx="4002536" cy="4340412"/>
+            <a:off x="956922" y="2322428"/>
+            <a:ext cx="4839444" cy="4340412"/>
           </a:xfrm>
           <a:prstGeom prst="rect">
             <a:avLst/>
@@ -6811,152 +6984,6 @@
     <p:extLst>
       <p:ext uri="{BB962C8B-B14F-4D97-AF65-F5344CB8AC3E}">
         <p14:creationId xmlns:p14="http://schemas.microsoft.com/office/powerpoint/2010/main" val="4259650083"/>
-      </p:ext>
-    </p:extLst>
-  </p:cSld>
-  <p:clrMapOvr>
-    <a:masterClrMapping/>
-  </p:clrMapOvr>
-</p:sld>
-</file>
-
-<file path=ppt/slides/slide8.xml><?xml version="1.0" encoding="utf-8"?>
-<p:sld xmlns:a="http://schemas.openxmlformats.org/drawingml/2006/main" xmlns:r="http://schemas.openxmlformats.org/officeDocument/2006/relationships" xmlns:p="http://schemas.openxmlformats.org/presentationml/2006/main">
-  <p:cSld>
-    <p:spTree>
-      <p:nvGrpSpPr>
-        <p:cNvPr id="1" name=""/>
-        <p:cNvGrpSpPr/>
-        <p:nvPr/>
-      </p:nvGrpSpPr>
-      <p:grpSpPr>
-        <a:xfrm>
-          <a:off x="0" y="0"/>
-          <a:ext cx="0" cy="0"/>
-          <a:chOff x="0" y="0"/>
-          <a:chExt cx="0" cy="0"/>
-        </a:xfrm>
-      </p:grpSpPr>
-      <p:sp>
-        <p:nvSpPr>
-          <p:cNvPr id="2" name="Tittel 1"/>
-          <p:cNvSpPr>
-            <a:spLocks noGrp="1"/>
-          </p:cNvSpPr>
-          <p:nvPr>
-            <p:ph type="title"/>
-          </p:nvPr>
-        </p:nvSpPr>
-        <p:spPr/>
-        <p:txBody>
-          <a:bodyPr/>
-          <a:lstStyle/>
-          <a:p>
-            <a:r>
-              <a:rPr lang="nb-NO" dirty="0" smtClean="0"/>
-              <a:t>Bilde med tekst som ligger over et bilde</a:t>
-            </a:r>
-            <a:endParaRPr lang="nb-NO" dirty="0"/>
-          </a:p>
-        </p:txBody>
-      </p:sp>
-      <p:sp>
-        <p:nvSpPr>
-          <p:cNvPr id="3" name="Plassholder for innhold 2"/>
-          <p:cNvSpPr>
-            <a:spLocks noGrp="1"/>
-          </p:cNvSpPr>
-          <p:nvPr>
-            <p:ph idx="1"/>
-          </p:nvPr>
-        </p:nvSpPr>
-        <p:spPr/>
-        <p:txBody>
-          <a:bodyPr/>
-          <a:lstStyle/>
-          <a:p>
-            <a:r>
-              <a:rPr lang="nb-NO" dirty="0" smtClean="0"/>
-              <a:t>Hvis vi legger HTML-elementer med absolutt posisjonering inni et HTML-element som har </a:t>
-            </a:r>
-            <a:r>
-              <a:rPr lang="nb-NO" i="1" dirty="0" err="1" smtClean="0"/>
-              <a:t>position</a:t>
-            </a:r>
-            <a:r>
-              <a:rPr lang="nb-NO" i="1" dirty="0" smtClean="0"/>
-              <a:t>: relative</a:t>
-            </a:r>
-            <a:r>
-              <a:rPr lang="nb-NO" dirty="0" smtClean="0"/>
-              <a:t>, vil avstandene settes i forhold til elementet med </a:t>
-            </a:r>
-            <a:r>
-              <a:rPr lang="nb-NO" i="1" dirty="0" err="1" smtClean="0"/>
-              <a:t>position</a:t>
-            </a:r>
-            <a:r>
-              <a:rPr lang="nb-NO" i="1" dirty="0" smtClean="0"/>
-              <a:t>: relative</a:t>
-            </a:r>
-            <a:r>
-              <a:rPr lang="nb-NO" dirty="0" smtClean="0"/>
-              <a:t>.</a:t>
-            </a:r>
-          </a:p>
-          <a:p>
-            <a:endParaRPr lang="nb-NO" dirty="0" smtClean="0"/>
-          </a:p>
-          <a:p>
-            <a:r>
-              <a:rPr lang="nb-NO" dirty="0" smtClean="0"/>
-              <a:t>Det HTML-elementet som legges inn lengst ned i HTML-koden legger seg over elementer som legges inn høyere opp.</a:t>
-            </a:r>
-          </a:p>
-          <a:p>
-            <a:endParaRPr lang="nb-NO" dirty="0"/>
-          </a:p>
-          <a:p>
-            <a:r>
-              <a:rPr lang="nb-NO" dirty="0" smtClean="0"/>
-              <a:t>Dette kan overstyres ved å sette CSS-stilen </a:t>
-            </a:r>
-            <a:r>
-              <a:rPr lang="nb-NO" i="1" dirty="0" smtClean="0"/>
-              <a:t>z-</a:t>
-            </a:r>
-            <a:r>
-              <a:rPr lang="nb-NO" i="1" dirty="0" err="1" smtClean="0"/>
-              <a:t>index</a:t>
-            </a:r>
-            <a:r>
-              <a:rPr lang="nb-NO" i="1" dirty="0" smtClean="0"/>
-              <a:t>: verdi;</a:t>
-            </a:r>
-            <a:r>
-              <a:rPr lang="nb-NO" dirty="0" smtClean="0"/>
-              <a:t> Jo høyere </a:t>
-            </a:r>
-            <a:r>
-              <a:rPr lang="nb-NO" i="1" dirty="0" smtClean="0"/>
-              <a:t>z-</a:t>
-            </a:r>
-            <a:r>
-              <a:rPr lang="nb-NO" i="1" dirty="0" err="1" smtClean="0"/>
-              <a:t>index</a:t>
-            </a:r>
-            <a:r>
-              <a:rPr lang="nb-NO" dirty="0" smtClean="0"/>
-              <a:t>, jo nærmere øyet legger HTML-elementet seg.</a:t>
-            </a:r>
-            <a:endParaRPr lang="nb-NO" i="1" dirty="0"/>
-          </a:p>
-        </p:txBody>
-      </p:sp>
-    </p:spTree>
-    <p:extLst>
-      <p:ext uri="{BB962C8B-B14F-4D97-AF65-F5344CB8AC3E}">
-        <p14:creationId xmlns:p14="http://schemas.microsoft.com/office/powerpoint/2010/main" val="2792464965"/>
       </p:ext>
     </p:extLst>
   </p:cSld>

</xml_diff>